<commit_message>
update VPC box in diagram to latest color
</commit_message>
<xml_diff>
--- a/docs/deployment_guide/images/cribl-cloudtrail-architecture-diagram.pptx
+++ b/docs/deployment_guide/images/cribl-cloudtrail-architecture-diagram.pptx
@@ -243,7 +243,7 @@
           <a:p>
             <a:fld id="{064EAE1D-83FC-497B-8F10-D6E19DBFCECB}" type="datetimeFigureOut">
               <a:rPr lang="en-US" smtClean="0"/>
-              <a:t>2/1/2023</a:t>
+              <a:t>2/8/2023</a:t>
             </a:fld>
             <a:endParaRPr lang="en-US"/>
           </a:p>
@@ -413,7 +413,7 @@
           <a:p>
             <a:fld id="{064EAE1D-83FC-497B-8F10-D6E19DBFCECB}" type="datetimeFigureOut">
               <a:rPr lang="en-US" smtClean="0"/>
-              <a:t>2/1/2023</a:t>
+              <a:t>2/8/2023</a:t>
             </a:fld>
             <a:endParaRPr lang="en-US"/>
           </a:p>
@@ -593,7 +593,7 @@
           <a:p>
             <a:fld id="{064EAE1D-83FC-497B-8F10-D6E19DBFCECB}" type="datetimeFigureOut">
               <a:rPr lang="en-US" smtClean="0"/>
-              <a:t>2/1/2023</a:t>
+              <a:t>2/8/2023</a:t>
             </a:fld>
             <a:endParaRPr lang="en-US"/>
           </a:p>
@@ -763,7 +763,7 @@
           <a:p>
             <a:fld id="{064EAE1D-83FC-497B-8F10-D6E19DBFCECB}" type="datetimeFigureOut">
               <a:rPr lang="en-US" smtClean="0"/>
-              <a:t>2/1/2023</a:t>
+              <a:t>2/8/2023</a:t>
             </a:fld>
             <a:endParaRPr lang="en-US"/>
           </a:p>
@@ -1007,7 +1007,7 @@
           <a:p>
             <a:fld id="{064EAE1D-83FC-497B-8F10-D6E19DBFCECB}" type="datetimeFigureOut">
               <a:rPr lang="en-US" smtClean="0"/>
-              <a:t>2/1/2023</a:t>
+              <a:t>2/8/2023</a:t>
             </a:fld>
             <a:endParaRPr lang="en-US"/>
           </a:p>
@@ -1239,7 +1239,7 @@
           <a:p>
             <a:fld id="{064EAE1D-83FC-497B-8F10-D6E19DBFCECB}" type="datetimeFigureOut">
               <a:rPr lang="en-US" smtClean="0"/>
-              <a:t>2/1/2023</a:t>
+              <a:t>2/8/2023</a:t>
             </a:fld>
             <a:endParaRPr lang="en-US"/>
           </a:p>
@@ -1606,7 +1606,7 @@
           <a:p>
             <a:fld id="{064EAE1D-83FC-497B-8F10-D6E19DBFCECB}" type="datetimeFigureOut">
               <a:rPr lang="en-US" smtClean="0"/>
-              <a:t>2/1/2023</a:t>
+              <a:t>2/8/2023</a:t>
             </a:fld>
             <a:endParaRPr lang="en-US"/>
           </a:p>
@@ -1724,7 +1724,7 @@
           <a:p>
             <a:fld id="{064EAE1D-83FC-497B-8F10-D6E19DBFCECB}" type="datetimeFigureOut">
               <a:rPr lang="en-US" smtClean="0"/>
-              <a:t>2/1/2023</a:t>
+              <a:t>2/8/2023</a:t>
             </a:fld>
             <a:endParaRPr lang="en-US"/>
           </a:p>
@@ -1819,7 +1819,7 @@
           <a:p>
             <a:fld id="{064EAE1D-83FC-497B-8F10-D6E19DBFCECB}" type="datetimeFigureOut">
               <a:rPr lang="en-US" smtClean="0"/>
-              <a:t>2/1/2023</a:t>
+              <a:t>2/8/2023</a:t>
             </a:fld>
             <a:endParaRPr lang="en-US"/>
           </a:p>
@@ -2096,7 +2096,7 @@
           <a:p>
             <a:fld id="{064EAE1D-83FC-497B-8F10-D6E19DBFCECB}" type="datetimeFigureOut">
               <a:rPr lang="en-US" smtClean="0"/>
-              <a:t>2/1/2023</a:t>
+              <a:t>2/8/2023</a:t>
             </a:fld>
             <a:endParaRPr lang="en-US"/>
           </a:p>
@@ -2353,7 +2353,7 @@
           <a:p>
             <a:fld id="{064EAE1D-83FC-497B-8F10-D6E19DBFCECB}" type="datetimeFigureOut">
               <a:rPr lang="en-US" smtClean="0"/>
-              <a:t>2/1/2023</a:t>
+              <a:t>2/8/2023</a:t>
             </a:fld>
             <a:endParaRPr lang="en-US"/>
           </a:p>
@@ -2566,7 +2566,7 @@
           <a:p>
             <a:fld id="{064EAE1D-83FC-497B-8F10-D6E19DBFCECB}" type="datetimeFigureOut">
               <a:rPr lang="en-US" smtClean="0"/>
-              <a:t>2/1/2023</a:t>
+              <a:t>2/8/2023</a:t>
             </a:fld>
             <a:endParaRPr lang="en-US"/>
           </a:p>
@@ -3315,76 +3315,6 @@
       </p:sp>
       <p:sp>
         <p:nvSpPr>
-          <p:cNvPr id="4" name="Rectangle 3">
-            <a:extLst>
-              <a:ext uri="{FF2B5EF4-FFF2-40B4-BE49-F238E27FC236}">
-                <a16:creationId xmlns:a16="http://schemas.microsoft.com/office/drawing/2014/main" id="{5540DEA9-611D-446A-B237-0D8582521A9A}"/>
-              </a:ext>
-            </a:extLst>
-          </p:cNvPr>
-          <p:cNvSpPr/>
-          <p:nvPr/>
-        </p:nvSpPr>
-        <p:spPr>
-          <a:xfrm>
-            <a:off x="2530220" y="2414797"/>
-            <a:ext cx="5772532" cy="2843002"/>
-          </a:xfrm>
-          <a:prstGeom prst="rect">
-            <a:avLst/>
-          </a:prstGeom>
-          <a:noFill/>
-          <a:ln w="12700">
-            <a:solidFill>
-              <a:srgbClr val="1E8900"/>
-            </a:solidFill>
-          </a:ln>
-        </p:spPr>
-        <p:style>
-          <a:lnRef idx="2">
-            <a:schemeClr val="accent1">
-              <a:shade val="50000"/>
-            </a:schemeClr>
-          </a:lnRef>
-          <a:fillRef idx="1">
-            <a:schemeClr val="accent1"/>
-          </a:fillRef>
-          <a:effectRef idx="0">
-            <a:schemeClr val="accent1"/>
-          </a:effectRef>
-          <a:fontRef idx="minor">
-            <a:schemeClr val="lt1"/>
-          </a:fontRef>
-        </p:style>
-        <p:txBody>
-          <a:bodyPr lIns="502920" tIns="91440"/>
-          <a:lstStyle/>
-          <a:p>
-            <a:pPr eaLnBrk="1" fontAlgn="auto" hangingPunct="1">
-              <a:spcBef>
-                <a:spcPts val="0"/>
-              </a:spcBef>
-              <a:spcAft>
-                <a:spcPts val="0"/>
-              </a:spcAft>
-              <a:defRPr/>
-            </a:pPr>
-            <a:r>
-              <a:rPr lang="en-US" sz="1200" dirty="0">
-                <a:ln w="0"/>
-                <a:solidFill>
-                  <a:srgbClr val="1E8900"/>
-                </a:solidFill>
-                <a:latin typeface="Arial" panose="020B0604020202020204" pitchFamily="34" charset="0"/>
-                <a:cs typeface="Arial" panose="020B0604020202020204" pitchFamily="34" charset="0"/>
-              </a:rPr>
-              <a:t>VPC</a:t>
-            </a:r>
-          </a:p>
-        </p:txBody>
-      </p:sp>
-      <p:sp>
-        <p:nvSpPr>
           <p:cNvPr id="5" name="Rectangle 4">
             <a:extLst>
               <a:ext uri="{FF2B5EF4-FFF2-40B4-BE49-F238E27FC236}">
@@ -3631,10 +3561,10 @@
       </p:pic>
       <p:pic>
         <p:nvPicPr>
-          <p:cNvPr id="10" name="Graphic 9">
+          <p:cNvPr id="11" name="Graphic 10">
             <a:extLst>
               <a:ext uri="{FF2B5EF4-FFF2-40B4-BE49-F238E27FC236}">
-                <a16:creationId xmlns:a16="http://schemas.microsoft.com/office/drawing/2014/main" id="{A56C3F53-AF16-4837-AFD5-4A561F882F00}"/>
+                <a16:creationId xmlns:a16="http://schemas.microsoft.com/office/drawing/2014/main" id="{075695FA-7BAA-4196-A77D-ABFA89002F96}"/>
               </a:ext>
             </a:extLst>
           </p:cNvPr>
@@ -3648,42 +3578,6 @@
             <a:extLst>
               <a:ext uri="{96DAC541-7B7A-43D3-8B79-37D633B846F1}">
                 <asvg:svgBlip xmlns:asvg="http://schemas.microsoft.com/office/drawing/2016/SVG/main" r:embed="rId6"/>
-              </a:ext>
-            </a:extLst>
-          </a:blip>
-          <a:stretch>
-            <a:fillRect/>
-          </a:stretch>
-        </p:blipFill>
-        <p:spPr>
-          <a:xfrm>
-            <a:off x="2532888" y="2414016"/>
-            <a:ext cx="381000" cy="381000"/>
-          </a:xfrm>
-          <a:prstGeom prst="rect">
-            <a:avLst/>
-          </a:prstGeom>
-        </p:spPr>
-      </p:pic>
-      <p:pic>
-        <p:nvPicPr>
-          <p:cNvPr id="11" name="Graphic 10">
-            <a:extLst>
-              <a:ext uri="{FF2B5EF4-FFF2-40B4-BE49-F238E27FC236}">
-                <a16:creationId xmlns:a16="http://schemas.microsoft.com/office/drawing/2014/main" id="{075695FA-7BAA-4196-A77D-ABFA89002F96}"/>
-              </a:ext>
-            </a:extLst>
-          </p:cNvPr>
-          <p:cNvPicPr>
-            <a:picLocks noChangeAspect="1"/>
-          </p:cNvPicPr>
-          <p:nvPr/>
-        </p:nvPicPr>
-        <p:blipFill>
-          <a:blip r:embed="rId7">
-            <a:extLst>
-              <a:ext uri="{96DAC541-7B7A-43D3-8B79-37D633B846F1}">
-                <asvg:svgBlip xmlns:asvg="http://schemas.microsoft.com/office/drawing/2016/SVG/main" r:embed="rId8"/>
               </a:ext>
             </a:extLst>
           </a:blip>
@@ -3716,10 +3610,10 @@
           <p:nvPr/>
         </p:nvPicPr>
         <p:blipFill>
-          <a:blip r:embed="rId9">
+          <a:blip r:embed="rId7">
             <a:extLst>
               <a:ext uri="{96DAC541-7B7A-43D3-8B79-37D633B846F1}">
-                <asvg:svgBlip xmlns:asvg="http://schemas.microsoft.com/office/drawing/2016/SVG/main" r:embed="rId10"/>
+                <asvg:svgBlip xmlns:asvg="http://schemas.microsoft.com/office/drawing/2016/SVG/main" r:embed="rId8"/>
               </a:ext>
             </a:extLst>
           </a:blip>
@@ -3752,7 +3646,7 @@
           <p:nvPr/>
         </p:nvPicPr>
         <p:blipFill>
-          <a:blip r:embed="rId11">
+          <a:blip r:embed="rId9">
             <a:extLst>
               <a:ext uri="{28A0092B-C50C-407E-A947-70E740481C1C}">
                 <a14:useLocalDpi xmlns:a14="http://schemas.microsoft.com/office/drawing/2010/main" val="0"/>
@@ -4123,10 +4017,10 @@
           <p:nvPr/>
         </p:nvPicPr>
         <p:blipFill>
-          <a:blip r:embed="rId7">
+          <a:blip r:embed="rId5">
             <a:extLst>
               <a:ext uri="{96DAC541-7B7A-43D3-8B79-37D633B846F1}">
-                <asvg:svgBlip xmlns:asvg="http://schemas.microsoft.com/office/drawing/2016/SVG/main" r:embed="rId8"/>
+                <asvg:svgBlip xmlns:asvg="http://schemas.microsoft.com/office/drawing/2016/SVG/main" r:embed="rId6"/>
               </a:ext>
             </a:extLst>
           </a:blip>
@@ -4159,7 +4053,7 @@
           <p:nvPr/>
         </p:nvPicPr>
         <p:blipFill>
-          <a:blip r:embed="rId11">
+          <a:blip r:embed="rId9">
             <a:extLst>
               <a:ext uri="{28A0092B-C50C-407E-A947-70E740481C1C}">
                 <a14:useLocalDpi xmlns:a14="http://schemas.microsoft.com/office/drawing/2010/main" val="0"/>
@@ -4388,10 +4282,10 @@
           <p:nvPr/>
         </p:nvPicPr>
         <p:blipFill>
-          <a:blip r:embed="rId12">
+          <a:blip r:embed="rId10">
             <a:extLst>
               <a:ext uri="{96DAC541-7B7A-43D3-8B79-37D633B846F1}">
-                <asvg:svgBlip xmlns:asvg="http://schemas.microsoft.com/office/drawing/2016/SVG/main" r:embed="rId13"/>
+                <asvg:svgBlip xmlns:asvg="http://schemas.microsoft.com/office/drawing/2016/SVG/main" r:embed="rId11"/>
               </a:ext>
             </a:extLst>
           </a:blip>
@@ -4874,7 +4768,7 @@
           <p:nvPr/>
         </p:nvPicPr>
         <p:blipFill>
-          <a:blip r:embed="rId14">
+          <a:blip r:embed="rId12">
             <a:extLst>
               <a:ext uri="{28A0092B-C50C-407E-A947-70E740481C1C}">
                 <a14:useLocalDpi xmlns:a14="http://schemas.microsoft.com/office/drawing/2010/main" val="0"/>
@@ -5095,7 +4989,7 @@
           <p:nvPr/>
         </p:nvPicPr>
         <p:blipFill>
-          <a:blip r:embed="rId15">
+          <a:blip r:embed="rId13">
             <a:extLst>
               <a:ext uri="{28A0092B-C50C-407E-A947-70E740481C1C}">
                 <a14:useLocalDpi xmlns:a14="http://schemas.microsoft.com/office/drawing/2010/main" val="0"/>
@@ -5316,7 +5210,7 @@
           <p:nvPr/>
         </p:nvPicPr>
         <p:blipFill>
-          <a:blip r:embed="rId16">
+          <a:blip r:embed="rId14">
             <a:extLst>
               <a:ext uri="{28A0092B-C50C-407E-A947-70E740481C1C}">
                 <a14:useLocalDpi xmlns:a14="http://schemas.microsoft.com/office/drawing/2010/main" val="0"/>
@@ -5537,7 +5431,7 @@
           <p:nvPr/>
         </p:nvPicPr>
         <p:blipFill>
-          <a:blip r:embed="rId17">
+          <a:blip r:embed="rId15">
             <a:extLst>
               <a:ext uri="{28A0092B-C50C-407E-A947-70E740481C1C}">
                 <a14:useLocalDpi xmlns:a14="http://schemas.microsoft.com/office/drawing/2010/main" val="0"/>
@@ -5597,7 +5491,7 @@
           <p:nvPr/>
         </p:nvPicPr>
         <p:blipFill>
-          <a:blip r:embed="rId18">
+          <a:blip r:embed="rId16">
             <a:extLst>
               <a:ext uri="{28A0092B-C50C-407E-A947-70E740481C1C}">
                 <a14:useLocalDpi xmlns:a14="http://schemas.microsoft.com/office/drawing/2010/main" val="0"/>
@@ -5803,6 +5697,111 @@
           </a:p>
         </p:txBody>
       </p:sp>
+      <p:sp>
+        <p:nvSpPr>
+          <p:cNvPr id="34" name="Rectangle 33">
+            <a:extLst>
+              <a:ext uri="{FF2B5EF4-FFF2-40B4-BE49-F238E27FC236}">
+                <a16:creationId xmlns:a16="http://schemas.microsoft.com/office/drawing/2014/main" id="{DB0CA420-DB65-44CE-94B4-82BA71E7CCBF}"/>
+              </a:ext>
+            </a:extLst>
+          </p:cNvPr>
+          <p:cNvSpPr/>
+          <p:nvPr/>
+        </p:nvSpPr>
+        <p:spPr>
+          <a:xfrm>
+            <a:off x="2532888" y="2414016"/>
+            <a:ext cx="5605272" cy="2843784"/>
+          </a:xfrm>
+          <a:prstGeom prst="rect">
+            <a:avLst/>
+          </a:prstGeom>
+          <a:noFill/>
+          <a:ln w="12700">
+            <a:solidFill>
+              <a:srgbClr val="693BC5"/>
+            </a:solidFill>
+          </a:ln>
+        </p:spPr>
+        <p:style>
+          <a:lnRef idx="2">
+            <a:schemeClr val="accent1">
+              <a:shade val="50000"/>
+            </a:schemeClr>
+          </a:lnRef>
+          <a:fillRef idx="1">
+            <a:schemeClr val="accent1"/>
+          </a:fillRef>
+          <a:effectRef idx="0">
+            <a:schemeClr val="accent1"/>
+          </a:effectRef>
+          <a:fontRef idx="minor">
+            <a:schemeClr val="lt1"/>
+          </a:fontRef>
+        </p:style>
+        <p:txBody>
+          <a:bodyPr lIns="502920" tIns="91440"/>
+          <a:lstStyle/>
+          <a:p>
+            <a:pPr eaLnBrk="1" fontAlgn="auto" hangingPunct="1">
+              <a:spcBef>
+                <a:spcPts val="0"/>
+              </a:spcBef>
+              <a:spcAft>
+                <a:spcPts val="0"/>
+              </a:spcAft>
+              <a:defRPr/>
+            </a:pPr>
+            <a:r>
+              <a:rPr lang="en-US" sz="1200" dirty="0">
+                <a:ln w="0"/>
+                <a:solidFill>
+                  <a:srgbClr val="693BC5"/>
+                </a:solidFill>
+                <a:latin typeface="Arial" panose="020B0604020202020204" pitchFamily="34" charset="0"/>
+                <a:cs typeface="Arial" panose="020B0604020202020204" pitchFamily="34" charset="0"/>
+              </a:rPr>
+              <a:t>VPC</a:t>
+            </a:r>
+          </a:p>
+        </p:txBody>
+      </p:sp>
+      <p:pic>
+        <p:nvPicPr>
+          <p:cNvPr id="35" name="Graphic 34">
+            <a:extLst>
+              <a:ext uri="{FF2B5EF4-FFF2-40B4-BE49-F238E27FC236}">
+                <a16:creationId xmlns:a16="http://schemas.microsoft.com/office/drawing/2014/main" id="{D41494B1-083E-42BE-AF3F-CD5D47FBAAAC}"/>
+              </a:ext>
+            </a:extLst>
+          </p:cNvPr>
+          <p:cNvPicPr>
+            <a:picLocks noChangeAspect="1"/>
+          </p:cNvPicPr>
+          <p:nvPr/>
+        </p:nvPicPr>
+        <p:blipFill>
+          <a:blip r:embed="rId17">
+            <a:extLst>
+              <a:ext uri="{96DAC541-7B7A-43D3-8B79-37D633B846F1}">
+                <asvg:svgBlip xmlns:asvg="http://schemas.microsoft.com/office/drawing/2016/SVG/main" r:embed="rId18"/>
+              </a:ext>
+            </a:extLst>
+          </a:blip>
+          <a:srcRect/>
+          <a:stretch/>
+        </p:blipFill>
+        <p:spPr>
+          <a:xfrm>
+            <a:off x="2532888" y="2414016"/>
+            <a:ext cx="381000" cy="381000"/>
+          </a:xfrm>
+          <a:prstGeom prst="rect">
+            <a:avLst/>
+          </a:prstGeom>
+        </p:spPr>
+      </p:pic>
     </p:spTree>
     <p:extLst>
       <p:ext uri="{BB962C8B-B14F-4D97-AF65-F5344CB8AC3E}">

</xml_diff>

<commit_message>
TW change Lambda from resource to service icon
</commit_message>
<xml_diff>
--- a/docs/deployment_guide/images/cribl-cloudtrail-architecture-diagram.pptx
+++ b/docs/deployment_guide/images/cribl-cloudtrail-architecture-diagram.pptx
@@ -243,7 +243,7 @@
           <a:p>
             <a:fld id="{064EAE1D-83FC-497B-8F10-D6E19DBFCECB}" type="datetimeFigureOut">
               <a:rPr lang="en-US" smtClean="0"/>
-              <a:t>2/8/2023</a:t>
+              <a:t>2/13/2023</a:t>
             </a:fld>
             <a:endParaRPr lang="en-US"/>
           </a:p>
@@ -413,7 +413,7 @@
           <a:p>
             <a:fld id="{064EAE1D-83FC-497B-8F10-D6E19DBFCECB}" type="datetimeFigureOut">
               <a:rPr lang="en-US" smtClean="0"/>
-              <a:t>2/8/2023</a:t>
+              <a:t>2/13/2023</a:t>
             </a:fld>
             <a:endParaRPr lang="en-US"/>
           </a:p>
@@ -593,7 +593,7 @@
           <a:p>
             <a:fld id="{064EAE1D-83FC-497B-8F10-D6E19DBFCECB}" type="datetimeFigureOut">
               <a:rPr lang="en-US" smtClean="0"/>
-              <a:t>2/8/2023</a:t>
+              <a:t>2/13/2023</a:t>
             </a:fld>
             <a:endParaRPr lang="en-US"/>
           </a:p>
@@ -763,7 +763,7 @@
           <a:p>
             <a:fld id="{064EAE1D-83FC-497B-8F10-D6E19DBFCECB}" type="datetimeFigureOut">
               <a:rPr lang="en-US" smtClean="0"/>
-              <a:t>2/8/2023</a:t>
+              <a:t>2/13/2023</a:t>
             </a:fld>
             <a:endParaRPr lang="en-US"/>
           </a:p>
@@ -1007,7 +1007,7 @@
           <a:p>
             <a:fld id="{064EAE1D-83FC-497B-8F10-D6E19DBFCECB}" type="datetimeFigureOut">
               <a:rPr lang="en-US" smtClean="0"/>
-              <a:t>2/8/2023</a:t>
+              <a:t>2/13/2023</a:t>
             </a:fld>
             <a:endParaRPr lang="en-US"/>
           </a:p>
@@ -1239,7 +1239,7 @@
           <a:p>
             <a:fld id="{064EAE1D-83FC-497B-8F10-D6E19DBFCECB}" type="datetimeFigureOut">
               <a:rPr lang="en-US" smtClean="0"/>
-              <a:t>2/8/2023</a:t>
+              <a:t>2/13/2023</a:t>
             </a:fld>
             <a:endParaRPr lang="en-US"/>
           </a:p>
@@ -1606,7 +1606,7 @@
           <a:p>
             <a:fld id="{064EAE1D-83FC-497B-8F10-D6E19DBFCECB}" type="datetimeFigureOut">
               <a:rPr lang="en-US" smtClean="0"/>
-              <a:t>2/8/2023</a:t>
+              <a:t>2/13/2023</a:t>
             </a:fld>
             <a:endParaRPr lang="en-US"/>
           </a:p>
@@ -1724,7 +1724,7 @@
           <a:p>
             <a:fld id="{064EAE1D-83FC-497B-8F10-D6E19DBFCECB}" type="datetimeFigureOut">
               <a:rPr lang="en-US" smtClean="0"/>
-              <a:t>2/8/2023</a:t>
+              <a:t>2/13/2023</a:t>
             </a:fld>
             <a:endParaRPr lang="en-US"/>
           </a:p>
@@ -1819,7 +1819,7 @@
           <a:p>
             <a:fld id="{064EAE1D-83FC-497B-8F10-D6E19DBFCECB}" type="datetimeFigureOut">
               <a:rPr lang="en-US" smtClean="0"/>
-              <a:t>2/8/2023</a:t>
+              <a:t>2/13/2023</a:t>
             </a:fld>
             <a:endParaRPr lang="en-US"/>
           </a:p>
@@ -2096,7 +2096,7 @@
           <a:p>
             <a:fld id="{064EAE1D-83FC-497B-8F10-D6E19DBFCECB}" type="datetimeFigureOut">
               <a:rPr lang="en-US" smtClean="0"/>
-              <a:t>2/8/2023</a:t>
+              <a:t>2/13/2023</a:t>
             </a:fld>
             <a:endParaRPr lang="en-US"/>
           </a:p>
@@ -2353,7 +2353,7 @@
           <a:p>
             <a:fld id="{064EAE1D-83FC-497B-8F10-D6E19DBFCECB}" type="datetimeFigureOut">
               <a:rPr lang="en-US" smtClean="0"/>
-              <a:t>2/8/2023</a:t>
+              <a:t>2/13/2023</a:t>
             </a:fld>
             <a:endParaRPr lang="en-US"/>
           </a:p>
@@ -2566,7 +2566,7 @@
           <a:p>
             <a:fld id="{064EAE1D-83FC-497B-8F10-D6E19DBFCECB}" type="datetimeFigureOut">
               <a:rPr lang="en-US" smtClean="0"/>
-              <a:t>2/8/2023</a:t>
+              <a:t>2/13/2023</a:t>
             </a:fld>
             <a:endParaRPr lang="en-US"/>
           </a:p>
@@ -5003,7 +5003,7 @@
         </p:blipFill>
         <p:spPr bwMode="auto">
           <a:xfrm>
-            <a:off x="8490705" y="3245265"/>
+            <a:off x="8490705" y="3252386"/>
             <a:ext cx="762000" cy="762000"/>
           </a:xfrm>
           <a:prstGeom prst="rect">
@@ -5271,7 +5271,7 @@
         </p:nvSpPr>
         <p:spPr bwMode="auto">
           <a:xfrm>
-            <a:off x="9350466" y="4016118"/>
+            <a:off x="12265306" y="6119228"/>
             <a:ext cx="1362074" cy="461665"/>
           </a:xfrm>
           <a:prstGeom prst="rect">
@@ -5445,7 +5445,7 @@
         </p:blipFill>
         <p:spPr bwMode="auto">
           <a:xfrm>
-            <a:off x="9802903" y="3397665"/>
+            <a:off x="12717743" y="5500775"/>
             <a:ext cx="457200" cy="457200"/>
           </a:xfrm>
           <a:prstGeom prst="rect">
@@ -5505,7 +5505,7 @@
         </p:blipFill>
         <p:spPr bwMode="auto">
           <a:xfrm>
-            <a:off x="9650503" y="2034560"/>
+            <a:off x="9675641" y="2034560"/>
             <a:ext cx="762000" cy="762000"/>
           </a:xfrm>
           <a:prstGeom prst="rect">
@@ -5552,7 +5552,7 @@
         </p:nvSpPr>
         <p:spPr bwMode="auto">
           <a:xfrm>
-            <a:off x="9387770" y="2805413"/>
+            <a:off x="9412908" y="2805413"/>
             <a:ext cx="1287467" cy="276999"/>
           </a:xfrm>
           <a:prstGeom prst="rect">
@@ -5802,6 +5802,227 @@
           </a:prstGeom>
         </p:spPr>
       </p:pic>
+      <p:pic>
+        <p:nvPicPr>
+          <p:cNvPr id="37" name="Graphic 10">
+            <a:extLst>
+              <a:ext uri="{FF2B5EF4-FFF2-40B4-BE49-F238E27FC236}">
+                <a16:creationId xmlns:a16="http://schemas.microsoft.com/office/drawing/2014/main" id="{8AB09096-E95C-4BAD-A30E-A47FF6E81332}"/>
+              </a:ext>
+            </a:extLst>
+          </p:cNvPr>
+          <p:cNvPicPr>
+            <a:picLocks noChangeAspect="1" noChangeArrowheads="1"/>
+          </p:cNvPicPr>
+          <p:nvPr/>
+        </p:nvPicPr>
+        <p:blipFill>
+          <a:blip r:embed="rId19">
+            <a:extLst>
+              <a:ext uri="{28A0092B-C50C-407E-A947-70E740481C1C}">
+                <a14:useLocalDpi xmlns:a14="http://schemas.microsoft.com/office/drawing/2010/main" val="0"/>
+              </a:ext>
+            </a:extLst>
+          </a:blip>
+          <a:srcRect/>
+          <a:stretch>
+            <a:fillRect/>
+          </a:stretch>
+        </p:blipFill>
+        <p:spPr bwMode="auto">
+          <a:xfrm>
+            <a:off x="9675641" y="3252386"/>
+            <a:ext cx="762000" cy="762000"/>
+          </a:xfrm>
+          <a:prstGeom prst="rect">
+            <a:avLst/>
+          </a:prstGeom>
+          <a:noFill/>
+          <a:ln>
+            <a:noFill/>
+          </a:ln>
+          <a:extLst>
+            <a:ext uri="{909E8E84-426E-40DD-AFC4-6F175D3DCCD1}">
+              <a14:hiddenFill xmlns:a14="http://schemas.microsoft.com/office/drawing/2010/main">
+                <a:solidFill>
+                  <a:srgbClr val="FFFFFF"/>
+                </a:solidFill>
+              </a14:hiddenFill>
+            </a:ext>
+            <a:ext uri="{91240B29-F687-4F45-9708-019B960494DF}">
+              <a14:hiddenLine xmlns:a14="http://schemas.microsoft.com/office/drawing/2010/main" w="9525">
+                <a:solidFill>
+                  <a:srgbClr val="000000"/>
+                </a:solidFill>
+                <a:miter lim="800000"/>
+                <a:headEnd/>
+                <a:tailEnd/>
+              </a14:hiddenLine>
+            </a:ext>
+          </a:extLst>
+        </p:spPr>
+      </p:pic>
+      <p:sp>
+        <p:nvSpPr>
+          <p:cNvPr id="38" name="TextBox 20">
+            <a:extLst>
+              <a:ext uri="{FF2B5EF4-FFF2-40B4-BE49-F238E27FC236}">
+                <a16:creationId xmlns:a16="http://schemas.microsoft.com/office/drawing/2014/main" id="{868E19C0-0D57-426A-BF5B-BE460ECC2AD1}"/>
+              </a:ext>
+            </a:extLst>
+          </p:cNvPr>
+          <p:cNvSpPr txBox="1">
+            <a:spLocks noChangeArrowheads="1"/>
+          </p:cNvSpPr>
+          <p:nvPr/>
+        </p:nvSpPr>
+        <p:spPr bwMode="auto">
+          <a:xfrm>
+            <a:off x="8910466" y="4016118"/>
+            <a:ext cx="2292350" cy="276999"/>
+          </a:xfrm>
+          <a:prstGeom prst="rect">
+            <a:avLst/>
+          </a:prstGeom>
+          <a:noFill/>
+          <a:ln>
+            <a:noFill/>
+          </a:ln>
+          <a:extLst>
+            <a:ext uri="{909E8E84-426E-40DD-AFC4-6F175D3DCCD1}">
+              <a14:hiddenFill xmlns:a14="http://schemas.microsoft.com/office/drawing/2010/main">
+                <a:solidFill>
+                  <a:srgbClr val="FFFFFF"/>
+                </a:solidFill>
+              </a14:hiddenFill>
+            </a:ext>
+            <a:ext uri="{91240B29-F687-4F45-9708-019B960494DF}">
+              <a14:hiddenLine xmlns:a14="http://schemas.microsoft.com/office/drawing/2010/main" w="9525">
+                <a:solidFill>
+                  <a:srgbClr val="000000"/>
+                </a:solidFill>
+                <a:miter lim="800000"/>
+                <a:headEnd/>
+                <a:tailEnd/>
+              </a14:hiddenLine>
+            </a:ext>
+          </a:extLst>
+        </p:spPr>
+        <p:txBody>
+          <a:bodyPr>
+            <a:spAutoFit/>
+          </a:bodyPr>
+          <a:lstStyle>
+            <a:lvl1pPr>
+              <a:defRPr>
+                <a:solidFill>
+                  <a:schemeClr val="tx1"/>
+                </a:solidFill>
+                <a:latin typeface="Calibri" panose="020F0502020204030204" pitchFamily="34" charset="0"/>
+              </a:defRPr>
+            </a:lvl1pPr>
+            <a:lvl2pPr marL="742950" indent="-285750">
+              <a:defRPr>
+                <a:solidFill>
+                  <a:schemeClr val="tx1"/>
+                </a:solidFill>
+                <a:latin typeface="Calibri" panose="020F0502020204030204" pitchFamily="34" charset="0"/>
+              </a:defRPr>
+            </a:lvl2pPr>
+            <a:lvl3pPr marL="1143000" indent="-228600">
+              <a:defRPr>
+                <a:solidFill>
+                  <a:schemeClr val="tx1"/>
+                </a:solidFill>
+                <a:latin typeface="Calibri" panose="020F0502020204030204" pitchFamily="34" charset="0"/>
+              </a:defRPr>
+            </a:lvl3pPr>
+            <a:lvl4pPr marL="1600200" indent="-228600">
+              <a:defRPr>
+                <a:solidFill>
+                  <a:schemeClr val="tx1"/>
+                </a:solidFill>
+                <a:latin typeface="Calibri" panose="020F0502020204030204" pitchFamily="34" charset="0"/>
+              </a:defRPr>
+            </a:lvl4pPr>
+            <a:lvl5pPr marL="2057400" indent="-228600">
+              <a:defRPr>
+                <a:solidFill>
+                  <a:schemeClr val="tx1"/>
+                </a:solidFill>
+                <a:latin typeface="Calibri" panose="020F0502020204030204" pitchFamily="34" charset="0"/>
+              </a:defRPr>
+            </a:lvl5pPr>
+            <a:lvl6pPr marL="2514600" indent="-228600" eaLnBrk="0" fontAlgn="base" hangingPunct="0">
+              <a:spcBef>
+                <a:spcPct val="0"/>
+              </a:spcBef>
+              <a:spcAft>
+                <a:spcPct val="0"/>
+              </a:spcAft>
+              <a:defRPr>
+                <a:solidFill>
+                  <a:schemeClr val="tx1"/>
+                </a:solidFill>
+                <a:latin typeface="Calibri" panose="020F0502020204030204" pitchFamily="34" charset="0"/>
+              </a:defRPr>
+            </a:lvl6pPr>
+            <a:lvl7pPr marL="2971800" indent="-228600" eaLnBrk="0" fontAlgn="base" hangingPunct="0">
+              <a:spcBef>
+                <a:spcPct val="0"/>
+              </a:spcBef>
+              <a:spcAft>
+                <a:spcPct val="0"/>
+              </a:spcAft>
+              <a:defRPr>
+                <a:solidFill>
+                  <a:schemeClr val="tx1"/>
+                </a:solidFill>
+                <a:latin typeface="Calibri" panose="020F0502020204030204" pitchFamily="34" charset="0"/>
+              </a:defRPr>
+            </a:lvl7pPr>
+            <a:lvl8pPr marL="3429000" indent="-228600" eaLnBrk="0" fontAlgn="base" hangingPunct="0">
+              <a:spcBef>
+                <a:spcPct val="0"/>
+              </a:spcBef>
+              <a:spcAft>
+                <a:spcPct val="0"/>
+              </a:spcAft>
+              <a:defRPr>
+                <a:solidFill>
+                  <a:schemeClr val="tx1"/>
+                </a:solidFill>
+                <a:latin typeface="Calibri" panose="020F0502020204030204" pitchFamily="34" charset="0"/>
+              </a:defRPr>
+            </a:lvl8pPr>
+            <a:lvl9pPr marL="3886200" indent="-228600" eaLnBrk="0" fontAlgn="base" hangingPunct="0">
+              <a:spcBef>
+                <a:spcPct val="0"/>
+              </a:spcBef>
+              <a:spcAft>
+                <a:spcPct val="0"/>
+              </a:spcAft>
+              <a:defRPr>
+                <a:solidFill>
+                  <a:schemeClr val="tx1"/>
+                </a:solidFill>
+                <a:latin typeface="Calibri" panose="020F0502020204030204" pitchFamily="34" charset="0"/>
+              </a:defRPr>
+            </a:lvl9pPr>
+          </a:lstStyle>
+          <a:p>
+            <a:pPr algn="ctr" eaLnBrk="1" hangingPunct="1"/>
+            <a:r>
+              <a:rPr lang="en-US" altLang="en-US" sz="1200" dirty="0">
+                <a:latin typeface="Arial" panose="020B0604020202020204" pitchFamily="34" charset="0"/>
+                <a:ea typeface="Amazon Ember" panose="020B0603020204020204" pitchFamily="34" charset="0"/>
+                <a:cs typeface="Arial" panose="020B0604020202020204" pitchFamily="34" charset="0"/>
+              </a:rPr>
+              <a:t>AWS Lambda</a:t>
+            </a:r>
+          </a:p>
+        </p:txBody>
+      </p:sp>
     </p:spTree>
     <p:extLst>
       <p:ext uri="{BB962C8B-B14F-4D97-AF65-F5344CB8AC3E}">

</xml_diff>